<commit_message>
latest version of the paper
</commit_message>
<xml_diff>
--- a/papers/journalSwarmControl/pictures/pdf/PotentialField.pptx
+++ b/papers/journalSwarmControl/pictures/pdf/PotentialField.pptx
@@ -288,7 +288,7 @@
           <a:p>
             <a:fld id="{9CBA829A-D9D5-46BA-A2F7-9C69DF31B345}" type="datetimeFigureOut">
               <a:rPr lang="en-US" smtClean="0"/>
-              <a:t>7/28/2016</a:t>
+              <a:t>8/3/16</a:t>
             </a:fld>
             <a:endParaRPr lang="en-US"/>
           </a:p>
@@ -458,7 +458,7 @@
           <a:p>
             <a:fld id="{9CBA829A-D9D5-46BA-A2F7-9C69DF31B345}" type="datetimeFigureOut">
               <a:rPr lang="en-US" smtClean="0"/>
-              <a:t>7/28/2016</a:t>
+              <a:t>8/3/16</a:t>
             </a:fld>
             <a:endParaRPr lang="en-US"/>
           </a:p>
@@ -638,7 +638,7 @@
           <a:p>
             <a:fld id="{9CBA829A-D9D5-46BA-A2F7-9C69DF31B345}" type="datetimeFigureOut">
               <a:rPr lang="en-US" smtClean="0"/>
-              <a:t>7/28/2016</a:t>
+              <a:t>8/3/16</a:t>
             </a:fld>
             <a:endParaRPr lang="en-US"/>
           </a:p>
@@ -808,7 +808,7 @@
           <a:p>
             <a:fld id="{9CBA829A-D9D5-46BA-A2F7-9C69DF31B345}" type="datetimeFigureOut">
               <a:rPr lang="en-US" smtClean="0"/>
-              <a:t>7/28/2016</a:t>
+              <a:t>8/3/16</a:t>
             </a:fld>
             <a:endParaRPr lang="en-US"/>
           </a:p>
@@ -1054,7 +1054,7 @@
           <a:p>
             <a:fld id="{9CBA829A-D9D5-46BA-A2F7-9C69DF31B345}" type="datetimeFigureOut">
               <a:rPr lang="en-US" smtClean="0"/>
-              <a:t>7/28/2016</a:t>
+              <a:t>8/3/16</a:t>
             </a:fld>
             <a:endParaRPr lang="en-US"/>
           </a:p>
@@ -1342,7 +1342,7 @@
           <a:p>
             <a:fld id="{9CBA829A-D9D5-46BA-A2F7-9C69DF31B345}" type="datetimeFigureOut">
               <a:rPr lang="en-US" smtClean="0"/>
-              <a:t>7/28/2016</a:t>
+              <a:t>8/3/16</a:t>
             </a:fld>
             <a:endParaRPr lang="en-US"/>
           </a:p>
@@ -1764,7 +1764,7 @@
           <a:p>
             <a:fld id="{9CBA829A-D9D5-46BA-A2F7-9C69DF31B345}" type="datetimeFigureOut">
               <a:rPr lang="en-US" smtClean="0"/>
-              <a:t>7/28/2016</a:t>
+              <a:t>8/3/16</a:t>
             </a:fld>
             <a:endParaRPr lang="en-US"/>
           </a:p>
@@ -1882,7 +1882,7 @@
           <a:p>
             <a:fld id="{9CBA829A-D9D5-46BA-A2F7-9C69DF31B345}" type="datetimeFigureOut">
               <a:rPr lang="en-US" smtClean="0"/>
-              <a:t>7/28/2016</a:t>
+              <a:t>8/3/16</a:t>
             </a:fld>
             <a:endParaRPr lang="en-US"/>
           </a:p>
@@ -1977,7 +1977,7 @@
           <a:p>
             <a:fld id="{9CBA829A-D9D5-46BA-A2F7-9C69DF31B345}" type="datetimeFigureOut">
               <a:rPr lang="en-US" smtClean="0"/>
-              <a:t>7/28/2016</a:t>
+              <a:t>8/3/16</a:t>
             </a:fld>
             <a:endParaRPr lang="en-US"/>
           </a:p>
@@ -2254,7 +2254,7 @@
           <a:p>
             <a:fld id="{9CBA829A-D9D5-46BA-A2F7-9C69DF31B345}" type="datetimeFigureOut">
               <a:rPr lang="en-US" smtClean="0"/>
-              <a:t>7/28/2016</a:t>
+              <a:t>8/3/16</a:t>
             </a:fld>
             <a:endParaRPr lang="en-US"/>
           </a:p>
@@ -2507,7 +2507,7 @@
           <a:p>
             <a:fld id="{9CBA829A-D9D5-46BA-A2F7-9C69DF31B345}" type="datetimeFigureOut">
               <a:rPr lang="en-US" smtClean="0"/>
-              <a:t>7/28/2016</a:t>
+              <a:t>8/3/16</a:t>
             </a:fld>
             <a:endParaRPr lang="en-US"/>
           </a:p>
@@ -2720,7 +2720,7 @@
           <a:p>
             <a:fld id="{9CBA829A-D9D5-46BA-A2F7-9C69DF31B345}" type="datetimeFigureOut">
               <a:rPr lang="en-US" smtClean="0"/>
-              <a:t>7/28/2016</a:t>
+              <a:t>8/3/16</a:t>
             </a:fld>
             <a:endParaRPr lang="en-US"/>
           </a:p>
@@ -3116,7 +3116,7 @@
         </p:blipFill>
         <p:spPr bwMode="auto">
           <a:xfrm>
-            <a:off x="304801" y="219435"/>
+            <a:off x="14799669" y="159222"/>
             <a:ext cx="6841131" cy="6851178"/>
           </a:xfrm>
           <a:prstGeom prst="rect">
@@ -3128,14 +3128,14 @@
           </a:ln>
           <a:effectLst/>
           <a:extLst>
-            <a:ext uri="{909E8E84-426E-40DD-AFC4-6F175D3DCCD1}">
+            <a:ext uri="{909E8E84-426E-40dd-AFC4-6F175D3DCCD1}">
               <a14:hiddenFill xmlns:a14="http://schemas.microsoft.com/office/drawing/2010/main">
                 <a:solidFill>
                   <a:schemeClr val="accent1"/>
                 </a:solidFill>
               </a14:hiddenFill>
             </a:ext>
-            <a:ext uri="{91240B29-F687-4F45-9708-019B960494DF}">
+            <a:ext uri="{91240B29-F687-4f45-9708-019B960494DF}">
               <a14:hiddenLine xmlns:a14="http://schemas.microsoft.com/office/drawing/2010/main" w="9525">
                 <a:solidFill>
                   <a:schemeClr val="tx1"/>
@@ -3145,7 +3145,7 @@
                 <a:tailEnd/>
               </a14:hiddenLine>
             </a:ext>
-            <a:ext uri="{AF507438-7753-43E0-B8FC-AC1667EBCBE1}">
+            <a:ext uri="{AF507438-7753-43e0-B8FC-AC1667EBCBE1}">
               <a14:hiddenEffects xmlns:a14="http://schemas.microsoft.com/office/drawing/2010/main">
                 <a:effectLst>
                   <a:outerShdw dist="35921" dir="2700000" algn="ctr" rotWithShape="0">
@@ -3178,7 +3178,7 @@
         </p:blipFill>
         <p:spPr bwMode="auto">
           <a:xfrm>
-            <a:off x="7543800" y="226638"/>
+            <a:off x="152400" y="166423"/>
             <a:ext cx="6844559" cy="6843977"/>
           </a:xfrm>
           <a:prstGeom prst="rect">
@@ -3190,14 +3190,14 @@
           </a:ln>
           <a:effectLst/>
           <a:extLst>
-            <a:ext uri="{909E8E84-426E-40DD-AFC4-6F175D3DCCD1}">
+            <a:ext uri="{909E8E84-426E-40dd-AFC4-6F175D3DCCD1}">
               <a14:hiddenFill xmlns:a14="http://schemas.microsoft.com/office/drawing/2010/main">
                 <a:solidFill>
                   <a:schemeClr val="accent1"/>
                 </a:solidFill>
               </a14:hiddenFill>
             </a:ext>
-            <a:ext uri="{91240B29-F687-4F45-9708-019B960494DF}">
+            <a:ext uri="{91240B29-F687-4f45-9708-019B960494DF}">
               <a14:hiddenLine xmlns:a14="http://schemas.microsoft.com/office/drawing/2010/main" w="9525">
                 <a:solidFill>
                   <a:schemeClr val="tx1"/>
@@ -3207,7 +3207,7 @@
                 <a:tailEnd/>
               </a14:hiddenLine>
             </a:ext>
-            <a:ext uri="{AF507438-7753-43E0-B8FC-AC1667EBCBE1}">
+            <a:ext uri="{AF507438-7753-43e0-B8FC-AC1667EBCBE1}">
               <a14:hiddenEffects xmlns:a14="http://schemas.microsoft.com/office/drawing/2010/main">
                 <a:effectLst>
                   <a:outerShdw dist="35921" dir="2700000" algn="ctr" rotWithShape="0">
@@ -3240,7 +3240,7 @@
         </p:blipFill>
         <p:spPr bwMode="auto">
           <a:xfrm>
-            <a:off x="14746706" y="215424"/>
+            <a:off x="7467600" y="152400"/>
             <a:ext cx="6850251" cy="6851178"/>
           </a:xfrm>
           <a:prstGeom prst="rect">
@@ -3252,14 +3252,14 @@
           </a:ln>
           <a:effectLst/>
           <a:extLst>
-            <a:ext uri="{909E8E84-426E-40DD-AFC4-6F175D3DCCD1}">
+            <a:ext uri="{909E8E84-426E-40dd-AFC4-6F175D3DCCD1}">
               <a14:hiddenFill xmlns:a14="http://schemas.microsoft.com/office/drawing/2010/main">
                 <a:solidFill>
                   <a:schemeClr val="accent1"/>
                 </a:solidFill>
               </a14:hiddenFill>
             </a:ext>
-            <a:ext uri="{91240B29-F687-4F45-9708-019B960494DF}">
+            <a:ext uri="{91240B29-F687-4f45-9708-019B960494DF}">
               <a14:hiddenLine xmlns:a14="http://schemas.microsoft.com/office/drawing/2010/main" w="9525">
                 <a:solidFill>
                   <a:schemeClr val="tx1"/>
@@ -3269,7 +3269,7 @@
                 <a:tailEnd/>
               </a14:hiddenLine>
             </a:ext>
-            <a:ext uri="{AF507438-7753-43E0-B8FC-AC1667EBCBE1}">
+            <a:ext uri="{AF507438-7753-43e0-B8FC-AC1667EBCBE1}">
               <a14:hiddenEffects xmlns:a14="http://schemas.microsoft.com/office/drawing/2010/main">
                 <a:effectLst>
                   <a:outerShdw dist="35921" dir="2700000" algn="ctr" rotWithShape="0">
@@ -3294,7 +3294,7 @@
   <p:timing>
     <p:tnLst>
       <p:par>
-        <p:cTn id="1" dur="indefinite" restart="never" nodeType="tmRoot"/>
+        <p:cTn xmlns:p14="http://schemas.microsoft.com/office/powerpoint/2010/main" id="1" dur="indefinite" restart="never" nodeType="tmRoot"/>
       </p:par>
     </p:tnLst>
   </p:timing>

</xml_diff>